<commit_message>
Fix plot_parabola.py code screenshot
</commit_message>
<xml_diff>
--- a/slides/Session 03 - 2D Graphics/Session 03 - 2D Graphics.pptx
+++ b/slides/Session 03 - 2D Graphics/Session 03 - 2D Graphics.pptx
@@ -297,7 +297,7 @@
           <a:p>
             <a:fld id="{A241AC98-512A-4A35-865E-757B6C1F07A2}" type="datetimeFigureOut">
               <a:rPr lang="en-US" smtClean="0"/>
-              <a:t>11/14/2022</a:t>
+              <a:t>11/21/2022</a:t>
             </a:fld>
             <a:endParaRPr lang="en-US"/>
           </a:p>
@@ -463,7 +463,7 @@
           <a:p>
             <a:fld id="{3854CEE7-15DE-41D9-8CA2-D1E137B1D850}" type="datetimeFigureOut">
               <a:rPr lang="en-US" smtClean="0"/>
-              <a:t>11/14/2022</a:t>
+              <a:t>11/21/2022</a:t>
             </a:fld>
             <a:endParaRPr lang="en-US"/>
           </a:p>
@@ -2458,7 +2458,7 @@
           <a:p>
             <a:fld id="{5555EB2C-244D-4423-AD97-018ED6478B87}" type="datetime1">
               <a:rPr lang="en-US" smtClean="0"/>
-              <a:t>11/14/2022</a:t>
+              <a:t>11/21/2022</a:t>
             </a:fld>
             <a:endParaRPr lang="en-US"/>
           </a:p>
@@ -2637,7 +2637,7 @@
           <a:p>
             <a:fld id="{A2B41D1F-7576-4C60-B4EB-5115BC56CF40}" type="datetime1">
               <a:rPr lang="en-US" smtClean="0"/>
-              <a:t>11/14/2022</a:t>
+              <a:t>11/21/2022</a:t>
             </a:fld>
             <a:endParaRPr lang="en-US"/>
           </a:p>
@@ -2829,7 +2829,7 @@
           <a:p>
             <a:fld id="{E79D1398-4D56-44F9-BA35-34ACF3159A64}" type="datetime1">
               <a:rPr lang="en-US" smtClean="0"/>
-              <a:t>11/14/2022</a:t>
+              <a:t>11/21/2022</a:t>
             </a:fld>
             <a:endParaRPr lang="en-US"/>
           </a:p>
@@ -3011,7 +3011,7 @@
           <a:p>
             <a:fld id="{A3CF632E-48CB-4EEB-A6B6-DEC7AD7CC976}" type="datetime1">
               <a:rPr lang="en-US" smtClean="0"/>
-              <a:t>11/14/2022</a:t>
+              <a:t>11/21/2022</a:t>
             </a:fld>
             <a:endParaRPr lang="en-US"/>
           </a:p>
@@ -3264,7 +3264,7 @@
           <a:p>
             <a:fld id="{BAEEE52C-3A57-458E-95F6-96B2FA9D1DD4}" type="datetime1">
               <a:rPr lang="en-US" smtClean="0"/>
-              <a:t>11/14/2022</a:t>
+              <a:t>11/21/2022</a:t>
             </a:fld>
             <a:endParaRPr lang="en-US"/>
           </a:p>
@@ -3508,7 +3508,7 @@
           <a:p>
             <a:fld id="{766FC747-A48A-4FF2-8EE4-3E95ECD1C2A8}" type="datetime1">
               <a:rPr lang="en-US" smtClean="0"/>
-              <a:t>11/14/2022</a:t>
+              <a:t>11/21/2022</a:t>
             </a:fld>
             <a:endParaRPr lang="en-US"/>
           </a:p>
@@ -3887,7 +3887,7 @@
           <a:p>
             <a:fld id="{C9BF5758-AB7F-463D-B638-E1729B95E126}" type="datetime1">
               <a:rPr lang="en-US" smtClean="0"/>
-              <a:t>11/14/2022</a:t>
+              <a:t>11/21/2022</a:t>
             </a:fld>
             <a:endParaRPr lang="en-US"/>
           </a:p>
@@ -4017,7 +4017,7 @@
           <a:p>
             <a:fld id="{F3718C77-7DD0-4738-BF52-D0EC9F78A76E}" type="datetime1">
               <a:rPr lang="en-US" smtClean="0"/>
-              <a:t>11/14/2022</a:t>
+              <a:t>11/21/2022</a:t>
             </a:fld>
             <a:endParaRPr lang="en-US"/>
           </a:p>
@@ -4124,7 +4124,7 @@
           <a:p>
             <a:fld id="{948970CF-13D9-4E1D-A74F-2CFE4953FCDB}" type="datetime1">
               <a:rPr lang="en-US" smtClean="0"/>
-              <a:t>11/14/2022</a:t>
+              <a:t>11/21/2022</a:t>
             </a:fld>
             <a:endParaRPr lang="en-US"/>
           </a:p>
@@ -4413,7 +4413,7 @@
           <a:p>
             <a:fld id="{F68C49B9-4E1C-4967-B9CF-0BF9FECBE837}" type="datetime1">
               <a:rPr lang="en-US" smtClean="0"/>
-              <a:t>11/14/2022</a:t>
+              <a:t>11/21/2022</a:t>
             </a:fld>
             <a:endParaRPr lang="en-US"/>
           </a:p>
@@ -4681,7 +4681,7 @@
           <a:p>
             <a:fld id="{7E338CBB-1F06-4333-9BBF-66628B15E581}" type="datetime1">
               <a:rPr lang="en-US" smtClean="0"/>
-              <a:t>11/14/2022</a:t>
+              <a:t>11/21/2022</a:t>
             </a:fld>
             <a:endParaRPr lang="en-US"/>
           </a:p>
@@ -4906,7 +4906,7 @@
           <a:p>
             <a:fld id="{705EC883-F03C-4CA3-AF62-BEF30EEA4F65}" type="datetime1">
               <a:rPr lang="en-US" smtClean="0"/>
-              <a:t>11/14/2022</a:t>
+              <a:t>11/21/2022</a:t>
             </a:fld>
             <a:endParaRPr lang="en-US"/>
           </a:p>
@@ -6580,10 +6580,10 @@
       </p:grpSpPr>
       <p:pic>
         <p:nvPicPr>
-          <p:cNvPr id="5" name="Picture 4">
+          <p:cNvPr id="42" name="Picture 41">
             <a:extLst>
               <a:ext uri="{FF2B5EF4-FFF2-40B4-BE49-F238E27FC236}">
-                <a16:creationId xmlns:a16="http://schemas.microsoft.com/office/drawing/2014/main" id="{230A22DF-4071-FFFE-E68E-41B9E3F4E793}"/>
+                <a16:creationId xmlns:a16="http://schemas.microsoft.com/office/drawing/2014/main" id="{441E1752-525C-F7B9-010F-667567300829}"/>
               </a:ext>
             </a:extLst>
           </p:cNvPr>
@@ -6600,8 +6600,8 @@
         </p:blipFill>
         <p:spPr>
           <a:xfrm>
-            <a:off x="408426" y="1454538"/>
-            <a:ext cx="5503878" cy="5084375"/>
+            <a:off x="412335" y="1462057"/>
+            <a:ext cx="5115333" cy="5083951"/>
           </a:xfrm>
           <a:prstGeom prst="rect">
             <a:avLst/>
@@ -6739,7 +6739,7 @@
         </p:nvGrpSpPr>
         <p:grpSpPr>
           <a:xfrm>
-            <a:off x="2696948" y="2580445"/>
+            <a:off x="2547830" y="2496766"/>
             <a:ext cx="1076632" cy="369332"/>
             <a:chOff x="4968362" y="2079211"/>
             <a:chExt cx="1076632" cy="369332"/>
@@ -6859,7 +6859,7 @@
         </p:nvGrpSpPr>
         <p:grpSpPr>
           <a:xfrm>
-            <a:off x="2332582" y="2750121"/>
+            <a:off x="2214092" y="2665124"/>
             <a:ext cx="1076632" cy="369332"/>
             <a:chOff x="4704120" y="2356972"/>
             <a:chExt cx="1076632" cy="369332"/>
@@ -6979,7 +6979,7 @@
         </p:nvGrpSpPr>
         <p:grpSpPr>
           <a:xfrm>
-            <a:off x="3232926" y="3079729"/>
+            <a:off x="3051154" y="2971838"/>
             <a:ext cx="1068643" cy="369332"/>
             <a:chOff x="3647644" y="4910075"/>
             <a:chExt cx="1068643" cy="369332"/>
@@ -7099,7 +7099,7 @@
         </p:nvGrpSpPr>
         <p:grpSpPr>
           <a:xfrm>
-            <a:off x="2889951" y="3268202"/>
+            <a:off x="2651377" y="3150671"/>
             <a:ext cx="1064340" cy="369332"/>
             <a:chOff x="3647644" y="5421073"/>
             <a:chExt cx="1064340" cy="369332"/>
@@ -7219,7 +7219,7 @@
         </p:nvGrpSpPr>
         <p:grpSpPr>
           <a:xfrm>
-            <a:off x="2158348" y="3421505"/>
+            <a:off x="2044850" y="3284316"/>
             <a:ext cx="1068643" cy="369332"/>
             <a:chOff x="3647644" y="5359159"/>
             <a:chExt cx="1068643" cy="369332"/>
@@ -7339,7 +7339,7 @@
         </p:nvGrpSpPr>
         <p:grpSpPr>
           <a:xfrm>
-            <a:off x="5881593" y="3912452"/>
+            <a:off x="4022473" y="3938038"/>
             <a:ext cx="1076632" cy="369332"/>
             <a:chOff x="2157212" y="5356391"/>
             <a:chExt cx="1076632" cy="369332"/>
@@ -7459,7 +7459,7 @@
         </p:nvGrpSpPr>
         <p:grpSpPr>
           <a:xfrm>
-            <a:off x="2517278" y="4193430"/>
+            <a:off x="2651377" y="4597285"/>
             <a:ext cx="1076632" cy="369332"/>
             <a:chOff x="2157212" y="5356391"/>
             <a:chExt cx="1076632" cy="369332"/>
@@ -7579,7 +7579,7 @@
         </p:nvGrpSpPr>
         <p:grpSpPr>
           <a:xfrm>
-            <a:off x="2824719" y="4807845"/>
+            <a:off x="4249138" y="5293755"/>
             <a:ext cx="1076632" cy="369332"/>
             <a:chOff x="2157212" y="5356391"/>
             <a:chExt cx="1076632" cy="369332"/>
@@ -7699,7 +7699,7 @@
         </p:nvGrpSpPr>
         <p:grpSpPr>
           <a:xfrm>
-            <a:off x="4570179" y="5621978"/>
+            <a:off x="1847414" y="5795873"/>
             <a:ext cx="1076632" cy="369332"/>
             <a:chOff x="2157212" y="5356391"/>
             <a:chExt cx="1076632" cy="369332"/>
@@ -7819,7 +7819,7 @@
         </p:nvGrpSpPr>
         <p:grpSpPr>
           <a:xfrm>
-            <a:off x="1923971" y="6097688"/>
+            <a:off x="1280442" y="6263238"/>
             <a:ext cx="1076632" cy="369332"/>
             <a:chOff x="2157212" y="5356391"/>
             <a:chExt cx="1076632" cy="369332"/>
@@ -7968,8 +7968,8 @@
         </p:nvSpPr>
         <p:spPr>
           <a:xfrm>
-            <a:off x="532154" y="1798820"/>
-            <a:ext cx="2758187" cy="432775"/>
+            <a:off x="779254" y="1776354"/>
+            <a:ext cx="2346195" cy="397410"/>
           </a:xfrm>
           <a:prstGeom prst="rect">
             <a:avLst/>
@@ -8006,8 +8006,8 @@
           </a:p>
         </p:txBody>
       </p:sp>
-      <mc:AlternateContent xmlns:mc="http://schemas.openxmlformats.org/markup-compatibility/2006" xmlns:a14="http://schemas.microsoft.com/office/drawing/2010/main">
-        <mc:Choice Requires="a14">
+      <mc:AlternateContent xmlns:mc="http://schemas.openxmlformats.org/markup-compatibility/2006">
+        <mc:Choice xmlns:a14="http://schemas.microsoft.com/office/drawing/2010/main" Requires="a14">
           <p:sp>
             <p:nvSpPr>
               <p:cNvPr id="41" name="TextBox 40">
@@ -8028,7 +8028,9 @@
               <a:prstGeom prst="rect">
                 <a:avLst/>
               </a:prstGeom>
-              <a:noFill/>
+              <a:solidFill>
+                <a:schemeClr val="bg1"/>
+              </a:solidFill>
               <a:ln>
                 <a:solidFill>
                   <a:schemeClr val="tx1"/>
@@ -8106,7 +8108,7 @@
             </p:txBody>
           </p:sp>
         </mc:Choice>
-        <mc:Fallback xmlns="">
+        <mc:Fallback>
           <p:sp>
             <p:nvSpPr>
               <p:cNvPr id="41" name="TextBox 40">
@@ -8185,6 +8187,9 @@
                     <p:cTn id="3" fill="hold">
                       <p:stCondLst>
                         <p:cond delay="indefinite"/>
+                        <p:cond evt="onBegin" delay="0">
+                          <p:tn val="2"/>
+                        </p:cond>
                       </p:stCondLst>
                       <p:childTnLst>
                         <p:par>
@@ -8194,7 +8199,7 @@
                             </p:stCondLst>
                             <p:childTnLst>
                               <p:par>
-                                <p:cTn id="5" presetID="16" presetClass="entr" presetSubtype="21" fill="hold" grpId="0" nodeType="clickEffect">
+                                <p:cTn id="5" presetID="16" presetClass="entr" presetSubtype="21" fill="hold" grpId="0" nodeType="afterEffect">
                                   <p:stCondLst>
                                     <p:cond delay="0"/>
                                   </p:stCondLst>
@@ -19456,7 +19461,22 @@
               <a:rPr lang="en-US" sz="3200" dirty="0">
                 <a:latin typeface="+mn-lt"/>
               </a:rPr>
-              <a:t> Line 17</a:t>
+              <a:t> Line 17 then </a:t>
+            </a:r>
+            <a:r>
+              <a:rPr lang="en-US" sz="3200" b="1" dirty="0">
+                <a:solidFill>
+                  <a:srgbClr val="00B050"/>
+                </a:solidFill>
+                <a:latin typeface="+mn-lt"/>
+              </a:rPr>
+              <a:t>Run</a:t>
+            </a:r>
+            <a:r>
+              <a:rPr lang="en-US" sz="3200" dirty="0">
+                <a:latin typeface="+mn-lt"/>
+              </a:rPr>
+              <a:t> again</a:t>
             </a:r>
           </a:p>
         </p:txBody>
@@ -20320,7 +20340,22 @@
               <a:rPr lang="en-US" sz="3200" dirty="0">
                 <a:latin typeface="+mn-lt"/>
               </a:rPr>
-              <a:t> Line 20</a:t>
+              <a:t> Line 20 then </a:t>
+            </a:r>
+            <a:r>
+              <a:rPr lang="en-US" sz="3200" b="1" dirty="0">
+                <a:solidFill>
+                  <a:srgbClr val="00B050"/>
+                </a:solidFill>
+                <a:latin typeface="+mn-lt"/>
+              </a:rPr>
+              <a:t>Run</a:t>
+            </a:r>
+            <a:r>
+              <a:rPr lang="en-US" sz="3200" dirty="0">
+                <a:latin typeface="+mn-lt"/>
+              </a:rPr>
+              <a:t> again</a:t>
             </a:r>
           </a:p>
         </p:txBody>
@@ -21554,7 +21589,22 @@
               <a:rPr lang="en-US" sz="3200" dirty="0">
                 <a:latin typeface="+mn-lt"/>
               </a:rPr>
-              <a:t> Line 23</a:t>
+              <a:t> Line 23 then </a:t>
+            </a:r>
+            <a:r>
+              <a:rPr lang="en-US" sz="3200" b="1" dirty="0">
+                <a:solidFill>
+                  <a:srgbClr val="00B050"/>
+                </a:solidFill>
+                <a:latin typeface="+mn-lt"/>
+              </a:rPr>
+              <a:t>Run</a:t>
+            </a:r>
+            <a:r>
+              <a:rPr lang="en-US" sz="3200" dirty="0">
+                <a:latin typeface="+mn-lt"/>
+              </a:rPr>
+              <a:t> again</a:t>
             </a:r>
           </a:p>
         </p:txBody>
@@ -24156,6 +24206,59 @@
           </a:prstGeom>
         </p:spPr>
       </p:pic>
+      <p:sp>
+        <p:nvSpPr>
+          <p:cNvPr id="3" name="Speech Bubble: Rectangle with Corners Rounded 2">
+            <a:extLst>
+              <a:ext uri="{FF2B5EF4-FFF2-40B4-BE49-F238E27FC236}">
+                <a16:creationId xmlns:a16="http://schemas.microsoft.com/office/drawing/2014/main" id="{DE3F398F-5944-60F0-F55C-5E442BD64DF5}"/>
+              </a:ext>
+            </a:extLst>
+          </p:cNvPr>
+          <p:cNvSpPr/>
+          <p:nvPr/>
+        </p:nvSpPr>
+        <p:spPr>
+          <a:xfrm>
+            <a:off x="6520159" y="1839755"/>
+            <a:ext cx="1686394" cy="1139254"/>
+          </a:xfrm>
+          <a:prstGeom prst="wedgeRoundRectCallout">
+            <a:avLst>
+              <a:gd name="adj1" fmla="val -58166"/>
+              <a:gd name="adj2" fmla="val 72369"/>
+              <a:gd name="adj3" fmla="val 16667"/>
+            </a:avLst>
+          </a:prstGeom>
+        </p:spPr>
+        <p:style>
+          <a:lnRef idx="2">
+            <a:schemeClr val="accent1">
+              <a:shade val="50000"/>
+            </a:schemeClr>
+          </a:lnRef>
+          <a:fillRef idx="1">
+            <a:schemeClr val="accent1"/>
+          </a:fillRef>
+          <a:effectRef idx="0">
+            <a:schemeClr val="accent1"/>
+          </a:effectRef>
+          <a:fontRef idx="minor">
+            <a:schemeClr val="lt1"/>
+          </a:fontRef>
+        </p:style>
+        <p:txBody>
+          <a:bodyPr rtlCol="0" anchor="ctr"/>
+          <a:lstStyle/>
+          <a:p>
+            <a:pPr algn="ctr"/>
+            <a:r>
+              <a:rPr lang="en-US" dirty="0"/>
+              <a:t>This is just one example of the output</a:t>
+            </a:r>
+          </a:p>
+        </p:txBody>
+      </p:sp>
     </p:spTree>
     <p:extLst>
       <p:ext uri="{BB962C8B-B14F-4D97-AF65-F5344CB8AC3E}">
@@ -24166,6 +24269,92 @@
   <p:clrMapOvr>
     <a:masterClrMapping/>
   </p:clrMapOvr>
+  <p:timing>
+    <p:tnLst>
+      <p:par>
+        <p:cTn id="1" dur="indefinite" restart="never" nodeType="tmRoot">
+          <p:childTnLst>
+            <p:seq concurrent="1" nextAc="seek">
+              <p:cTn id="2" dur="indefinite" nodeType="mainSeq">
+                <p:childTnLst>
+                  <p:par>
+                    <p:cTn id="3" fill="hold">
+                      <p:stCondLst>
+                        <p:cond delay="indefinite"/>
+                      </p:stCondLst>
+                      <p:childTnLst>
+                        <p:par>
+                          <p:cTn id="4" fill="hold">
+                            <p:stCondLst>
+                              <p:cond delay="0"/>
+                            </p:stCondLst>
+                            <p:childTnLst>
+                              <p:par>
+                                <p:cTn id="5" presetID="22" presetClass="entr" presetSubtype="1" fill="hold" grpId="0" nodeType="clickEffect">
+                                  <p:stCondLst>
+                                    <p:cond delay="0"/>
+                                  </p:stCondLst>
+                                  <p:childTnLst>
+                                    <p:set>
+                                      <p:cBhvr>
+                                        <p:cTn id="6" dur="1" fill="hold">
+                                          <p:stCondLst>
+                                            <p:cond delay="0"/>
+                                          </p:stCondLst>
+                                        </p:cTn>
+                                        <p:tgtEl>
+                                          <p:spTgt spid="3"/>
+                                        </p:tgtEl>
+                                        <p:attrNameLst>
+                                          <p:attrName>style.visibility</p:attrName>
+                                        </p:attrNameLst>
+                                      </p:cBhvr>
+                                      <p:to>
+                                        <p:strVal val="visible"/>
+                                      </p:to>
+                                    </p:set>
+                                    <p:animEffect transition="in" filter="wipe(up)">
+                                      <p:cBhvr>
+                                        <p:cTn id="7" dur="500"/>
+                                        <p:tgtEl>
+                                          <p:spTgt spid="3"/>
+                                        </p:tgtEl>
+                                      </p:cBhvr>
+                                    </p:animEffect>
+                                  </p:childTnLst>
+                                </p:cTn>
+                              </p:par>
+                            </p:childTnLst>
+                          </p:cTn>
+                        </p:par>
+                      </p:childTnLst>
+                    </p:cTn>
+                  </p:par>
+                </p:childTnLst>
+              </p:cTn>
+              <p:prevCondLst>
+                <p:cond evt="onPrev" delay="0">
+                  <p:tgtEl>
+                    <p:sldTgt/>
+                  </p:tgtEl>
+                </p:cond>
+              </p:prevCondLst>
+              <p:nextCondLst>
+                <p:cond evt="onNext" delay="0">
+                  <p:tgtEl>
+                    <p:sldTgt/>
+                  </p:tgtEl>
+                </p:cond>
+              </p:nextCondLst>
+            </p:seq>
+          </p:childTnLst>
+        </p:cTn>
+      </p:par>
+    </p:tnLst>
+    <p:bldLst>
+      <p:bldP spid="3" grpId="0" animBg="1"/>
+    </p:bldLst>
+  </p:timing>
 </p:sld>
 </file>
 

</xml_diff>